<commit_message>
Final poster + regression figure
</commit_message>
<xml_diff>
--- a/meta/CS231n Poster.pptx
+++ b/meta/CS231n Poster.pptx
@@ -3913,34 +3913,6 @@
           <a:chExt cx="0" cy="0"/>
         </a:xfrm>
       </p:grpSpPr>
-      <p:pic>
-        <p:nvPicPr>
-          <p:cNvPr id="54" name="Shape 54"/>
-          <p:cNvPicPr preferRelativeResize="0"/>
-          <p:nvPr/>
-        </p:nvPicPr>
-        <p:blipFill>
-          <a:blip r:embed="rId3">
-            <a:alphaModFix/>
-          </a:blip>
-          <a:stretch>
-            <a:fillRect/>
-          </a:stretch>
-        </p:blipFill>
-        <p:spPr>
-          <a:xfrm>
-            <a:off x="24400174" y="5503025"/>
-            <a:ext cx="8286901" cy="4526287"/>
-          </a:xfrm>
-          <a:prstGeom prst="rect">
-            <a:avLst/>
-          </a:prstGeom>
-          <a:noFill/>
-          <a:ln>
-            <a:noFill/>
-          </a:ln>
-        </p:spPr>
-      </p:pic>
       <p:sp>
         <p:nvSpPr>
           <p:cNvPr id="55" name="Shape 55"/>
@@ -3991,7 +3963,7 @@
           <p:nvPr/>
         </p:nvPicPr>
         <p:blipFill>
-          <a:blip r:embed="rId4">
+          <a:blip r:embed="rId3">
             <a:alphaModFix/>
           </a:blip>
           <a:stretch>
@@ -4019,7 +3991,7 @@
           <p:nvPr/>
         </p:nvPicPr>
         <p:blipFill>
-          <a:blip r:embed="rId5">
+          <a:blip r:embed="rId4">
             <a:alphaModFix/>
           </a:blip>
           <a:stretch>
@@ -4116,7 +4088,7 @@
           <p:nvPr/>
         </p:nvPicPr>
         <p:blipFill>
-          <a:blip r:embed="rId6">
+          <a:blip r:embed="rId5">
             <a:alphaModFix/>
           </a:blip>
           <a:stretch>
@@ -4799,7 +4771,7 @@
           <p:nvPr/>
         </p:nvPicPr>
         <p:blipFill>
-          <a:blip r:embed="rId7">
+          <a:blip r:embed="rId6">
             <a:alphaModFix/>
           </a:blip>
           <a:stretch>
@@ -4978,7 +4950,7 @@
           <p:nvPr/>
         </p:nvPicPr>
         <p:blipFill>
-          <a:blip r:embed="rId8">
+          <a:blip r:embed="rId7">
             <a:alphaModFix/>
           </a:blip>
           <a:stretch>
@@ -5108,7 +5080,7 @@
             <p:nvPr/>
           </p:nvPicPr>
           <p:blipFill>
-            <a:blip r:embed="rId9">
+            <a:blip r:embed="rId8">
               <a:alphaModFix/>
             </a:blip>
             <a:stretch>
@@ -8574,7 +8546,7 @@
           <p:nvPr/>
         </p:nvPicPr>
         <p:blipFill>
-          <a:blip r:embed="rId10">
+          <a:blip r:embed="rId9">
             <a:extLst>
               <a:ext uri="{28A0092B-C50C-407E-A947-70E740481C1C}">
                 <a14:useLocalDpi xmlns:a14="http://schemas.microsoft.com/office/drawing/2010/main" val="0"/>
@@ -8604,7 +8576,7 @@
           <p:nvPr/>
         </p:nvPicPr>
         <p:blipFill>
-          <a:blip r:embed="rId11">
+          <a:blip r:embed="rId10">
             <a:extLst>
               <a:ext uri="{28A0092B-C50C-407E-A947-70E740481C1C}">
                 <a14:useLocalDpi xmlns:a14="http://schemas.microsoft.com/office/drawing/2010/main" val="0"/>
@@ -8619,6 +8591,36 @@
           <a:xfrm>
             <a:off x="859147" y="11232007"/>
             <a:ext cx="7561363" cy="10713593"/>
+          </a:xfrm>
+          <a:prstGeom prst="rect">
+            <a:avLst/>
+          </a:prstGeom>
+        </p:spPr>
+      </p:pic>
+      <p:pic>
+        <p:nvPicPr>
+          <p:cNvPr id="4" name="Picture 3" descr="cv_scores_nice.ai"/>
+          <p:cNvPicPr>
+            <a:picLocks noChangeAspect="1"/>
+          </p:cNvPicPr>
+          <p:nvPr/>
+        </p:nvPicPr>
+        <p:blipFill>
+          <a:blip r:embed="rId11">
+            <a:extLst>
+              <a:ext uri="{28A0092B-C50C-407E-A947-70E740481C1C}">
+                <a14:useLocalDpi xmlns:a14="http://schemas.microsoft.com/office/drawing/2010/main" val="0"/>
+              </a:ext>
+            </a:extLst>
+          </a:blip>
+          <a:stretch>
+            <a:fillRect/>
+          </a:stretch>
+        </p:blipFill>
+        <p:spPr>
+          <a:xfrm>
+            <a:off x="23486535" y="5391463"/>
+            <a:ext cx="9889064" cy="5083326"/>
           </a:xfrm>
           <a:prstGeom prst="rect">
             <a:avLst/>

</xml_diff>